<commit_message>
Fix some formatting in slide deck
</commit_message>
<xml_diff>
--- a/defense.pptx
+++ b/defense.pptx
@@ -36,11 +36,11 @@
     <p:sldId id="389" r:id="rId27"/>
     <p:sldId id="351" r:id="rId28"/>
     <p:sldId id="313" r:id="rId29"/>
-    <p:sldId id="315" r:id="rId30"/>
-    <p:sldId id="316" r:id="rId31"/>
-    <p:sldId id="318" r:id="rId32"/>
-    <p:sldId id="320" r:id="rId33"/>
-    <p:sldId id="342" r:id="rId34"/>
+    <p:sldId id="390" r:id="rId30"/>
+    <p:sldId id="391" r:id="rId31"/>
+    <p:sldId id="392" r:id="rId32"/>
+    <p:sldId id="393" r:id="rId33"/>
+    <p:sldId id="394" r:id="rId34"/>
     <p:sldId id="360" r:id="rId35"/>
     <p:sldId id="386" r:id="rId36"/>
     <p:sldId id="361" r:id="rId37"/>
@@ -266,7 +266,7 @@
           <a:p>
             <a:fld id="{574F237D-61F9-644C-A500-A74A357CABC7}" type="datetimeFigureOut">
               <a:rPr lang="en-US" smtClean="0"/>
-              <a:t>4/21/18</a:t>
+              <a:t>5/1/18</a:t>
             </a:fld>
             <a:endParaRPr lang="en-US"/>
           </a:p>
@@ -1518,29 +1518,27 @@
           <a:p>
             <a:r>
               <a:rPr lang="en-US" dirty="0" smtClean="0"/>
-              <a:t>Next, let me talk</a:t>
+              <a:t>SAY: in what </a:t>
+            </a:r>
+            <a:r>
+              <a:rPr lang="en-US" dirty="0" err="1" smtClean="0"/>
+              <a:t>lang</a:t>
+            </a:r>
+            <a:r>
+              <a:rPr lang="en-US" dirty="0" smtClean="0"/>
+              <a:t> are you allowed</a:t>
             </a:r>
             <a:r>
               <a:rPr lang="en-US" baseline="0" dirty="0" smtClean="0"/>
-              <a:t> about </a:t>
+              <a:t> to use </a:t>
             </a:r>
             <a:r>
               <a:rPr lang="en-US" baseline="0" dirty="0" err="1" smtClean="0"/>
-              <a:t>resugaring</a:t>
+              <a:t>calc</a:t>
             </a:r>
             <a:r>
               <a:rPr lang="en-US" baseline="0" dirty="0" smtClean="0"/>
-              <a:t> scope rules.</a:t>
-            </a:r>
-          </a:p>
-          <a:p>
-            <a:r>
-              <a:rPr lang="en-US" baseline="0" dirty="0" err="1" smtClean="0"/>
-              <a:t>Scoe</a:t>
-            </a:r>
-            <a:r>
-              <a:rPr lang="en-US" baseline="0" dirty="0" smtClean="0"/>
-              <a:t> rules are declarative rules that tell you where variables are bound</a:t>
+              <a:t>-type?</a:t>
             </a:r>
             <a:endParaRPr lang="en-US" dirty="0"/>
           </a:p>
@@ -1563,7 +1561,7 @@
           <a:p>
             <a:fld id="{EBCFF49A-32B0-634D-8969-0EE12B8F37A2}" type="slidenum">
               <a:rPr lang="en-US" smtClean="0"/>
-              <a:t>34</a:t>
+              <a:t>29</a:t>
             </a:fld>
             <a:endParaRPr lang="en-US"/>
           </a:p>
@@ -1572,7 +1570,7 @@
     </p:spTree>
     <p:extLst>
       <p:ext uri="{BB962C8B-B14F-4D97-AF65-F5344CB8AC3E}">
-        <p14:creationId xmlns:p14="http://schemas.microsoft.com/office/powerpoint/2010/main" val="1927347735"/>
+        <p14:creationId xmlns:p14="http://schemas.microsoft.com/office/powerpoint/2010/main" val="704507859"/>
       </p:ext>
     </p:extLst>
   </p:cSld>
@@ -1628,70 +1626,9 @@
           <a:p>
             <a:r>
               <a:rPr lang="en-US" dirty="0" smtClean="0"/>
-              <a:t>Attribution: macro from Alexandria project</a:t>
-            </a:r>
-          </a:p>
-          <a:p>
-            <a:endParaRPr lang="en-US" dirty="0" smtClean="0"/>
-          </a:p>
-          <a:p>
-            <a:r>
-              <a:rPr lang="en-US" dirty="0" smtClean="0"/>
-              <a:t>; my attempt to define it, since the source code just calls out to</a:t>
-            </a:r>
-            <a:r>
-              <a:rPr lang="en-US" baseline="0" dirty="0" smtClean="0"/>
-              <a:t> something called ‘labels’?</a:t>
-            </a:r>
-            <a:endParaRPr lang="en-US" dirty="0" smtClean="0"/>
-          </a:p>
-          <a:p>
-            <a:r>
-              <a:rPr lang="en-US" dirty="0" smtClean="0"/>
-              <a:t>(define-syntax-rule (named-lambda name</a:t>
-            </a:r>
-            <a:r>
-              <a:rPr lang="en-US" baseline="0" dirty="0" smtClean="0"/>
-              <a:t> (x ...) body)</a:t>
-            </a:r>
-          </a:p>
-          <a:p>
-            <a:r>
-              <a:rPr lang="en-US" baseline="0" dirty="0" smtClean="0"/>
-              <a:t>  (</a:t>
-            </a:r>
-            <a:r>
-              <a:rPr lang="en-US" baseline="0" dirty="0" err="1" smtClean="0"/>
-              <a:t>letrec</a:t>
-            </a:r>
-            <a:r>
-              <a:rPr lang="en-US" baseline="0" dirty="0" smtClean="0"/>
-              <a:t> ((name (lambda (x ...) body)))</a:t>
-            </a:r>
-          </a:p>
-          <a:p>
-            <a:r>
-              <a:rPr lang="en-US" baseline="0" dirty="0" smtClean="0"/>
-              <a:t>    name))</a:t>
-            </a:r>
-          </a:p>
-          <a:p>
-            <a:endParaRPr lang="en-US" baseline="0" dirty="0" smtClean="0"/>
-          </a:p>
-          <a:p>
-            <a:r>
-              <a:rPr lang="en-US" baseline="0" dirty="0" smtClean="0"/>
-              <a:t>;  (labels ((name </a:t>
-            </a:r>
-            <a:r>
-              <a:rPr lang="en-US" baseline="0" dirty="0" err="1" smtClean="0"/>
-              <a:t>args</a:t>
-            </a:r>
-            <a:r>
-              <a:rPr lang="en-US" baseline="0" dirty="0" smtClean="0"/>
-              <a:t> @body)) name))</a:t>
-            </a:r>
-            <a:endParaRPr lang="en-US" dirty="0" smtClean="0"/>
+              <a:t>SAY: why are these dashed?</a:t>
+            </a:r>
+            <a:endParaRPr lang="en-US" dirty="0"/>
           </a:p>
         </p:txBody>
       </p:sp>
@@ -1712,7 +1649,7 @@
           <a:p>
             <a:fld id="{EBCFF49A-32B0-634D-8969-0EE12B8F37A2}" type="slidenum">
               <a:rPr lang="en-US" smtClean="0"/>
-              <a:t>37</a:t>
+              <a:t>31</a:t>
             </a:fld>
             <a:endParaRPr lang="en-US"/>
           </a:p>
@@ -1721,7 +1658,7 @@
     </p:spTree>
     <p:extLst>
       <p:ext uri="{BB962C8B-B14F-4D97-AF65-F5344CB8AC3E}">
-        <p14:creationId xmlns:p14="http://schemas.microsoft.com/office/powerpoint/2010/main" val="1320138295"/>
+        <p14:creationId xmlns:p14="http://schemas.microsoft.com/office/powerpoint/2010/main" val="1693565818"/>
       </p:ext>
     </p:extLst>
   </p:cSld>
@@ -1884,6 +1821,32 @@
           <a:bodyPr/>
           <a:lstStyle/>
           <a:p>
+            <a:r>
+              <a:rPr lang="en-US" dirty="0" smtClean="0"/>
+              <a:t>Next, let me talk</a:t>
+            </a:r>
+            <a:r>
+              <a:rPr lang="en-US" baseline="0" dirty="0" smtClean="0"/>
+              <a:t> about </a:t>
+            </a:r>
+            <a:r>
+              <a:rPr lang="en-US" baseline="0" dirty="0" err="1" smtClean="0"/>
+              <a:t>resugaring</a:t>
+            </a:r>
+            <a:r>
+              <a:rPr lang="en-US" baseline="0" dirty="0" smtClean="0"/>
+              <a:t> scope rules.</a:t>
+            </a:r>
+          </a:p>
+          <a:p>
+            <a:r>
+              <a:rPr lang="en-US" baseline="0" dirty="0" err="1" smtClean="0"/>
+              <a:t>Scoe</a:t>
+            </a:r>
+            <a:r>
+              <a:rPr lang="en-US" baseline="0" dirty="0" smtClean="0"/>
+              <a:t> rules are declarative rules that tell you where variables are bound</a:t>
+            </a:r>
             <a:endParaRPr lang="en-US" dirty="0"/>
           </a:p>
         </p:txBody>
@@ -1905,7 +1868,7 @@
           <a:p>
             <a:fld id="{EBCFF49A-32B0-634D-8969-0EE12B8F37A2}" type="slidenum">
               <a:rPr lang="en-US" smtClean="0"/>
-              <a:t>38</a:t>
+              <a:t>34</a:t>
             </a:fld>
             <a:endParaRPr lang="en-US"/>
           </a:p>
@@ -1914,7 +1877,7 @@
     </p:spTree>
     <p:extLst>
       <p:ext uri="{BB962C8B-B14F-4D97-AF65-F5344CB8AC3E}">
-        <p14:creationId xmlns:p14="http://schemas.microsoft.com/office/powerpoint/2010/main" val="963639383"/>
+        <p14:creationId xmlns:p14="http://schemas.microsoft.com/office/powerpoint/2010/main" val="1927347735"/>
       </p:ext>
     </p:extLst>
   </p:cSld>
@@ -1968,7 +1931,72 @@
           <a:bodyPr/>
           <a:lstStyle/>
           <a:p>
-            <a:endParaRPr lang="en-US" dirty="0"/>
+            <a:r>
+              <a:rPr lang="en-US" dirty="0" smtClean="0"/>
+              <a:t>Attribution: macro from Alexandria project</a:t>
+            </a:r>
+          </a:p>
+          <a:p>
+            <a:endParaRPr lang="en-US" dirty="0" smtClean="0"/>
+          </a:p>
+          <a:p>
+            <a:r>
+              <a:rPr lang="en-US" dirty="0" smtClean="0"/>
+              <a:t>; my attempt to define it, since the source code just calls out to</a:t>
+            </a:r>
+            <a:r>
+              <a:rPr lang="en-US" baseline="0" dirty="0" smtClean="0"/>
+              <a:t> something called ‘labels’?</a:t>
+            </a:r>
+            <a:endParaRPr lang="en-US" dirty="0" smtClean="0"/>
+          </a:p>
+          <a:p>
+            <a:r>
+              <a:rPr lang="en-US" dirty="0" smtClean="0"/>
+              <a:t>(define-syntax-rule (named-lambda name</a:t>
+            </a:r>
+            <a:r>
+              <a:rPr lang="en-US" baseline="0" dirty="0" smtClean="0"/>
+              <a:t> (x ...) body)</a:t>
+            </a:r>
+          </a:p>
+          <a:p>
+            <a:r>
+              <a:rPr lang="en-US" baseline="0" dirty="0" smtClean="0"/>
+              <a:t>  (</a:t>
+            </a:r>
+            <a:r>
+              <a:rPr lang="en-US" baseline="0" dirty="0" err="1" smtClean="0"/>
+              <a:t>letrec</a:t>
+            </a:r>
+            <a:r>
+              <a:rPr lang="en-US" baseline="0" dirty="0" smtClean="0"/>
+              <a:t> ((name (lambda (x ...) body)))</a:t>
+            </a:r>
+          </a:p>
+          <a:p>
+            <a:r>
+              <a:rPr lang="en-US" baseline="0" dirty="0" smtClean="0"/>
+              <a:t>    name))</a:t>
+            </a:r>
+          </a:p>
+          <a:p>
+            <a:endParaRPr lang="en-US" baseline="0" dirty="0" smtClean="0"/>
+          </a:p>
+          <a:p>
+            <a:r>
+              <a:rPr lang="en-US" baseline="0" dirty="0" smtClean="0"/>
+              <a:t>;  (labels ((name </a:t>
+            </a:r>
+            <a:r>
+              <a:rPr lang="en-US" baseline="0" dirty="0" err="1" smtClean="0"/>
+              <a:t>args</a:t>
+            </a:r>
+            <a:r>
+              <a:rPr lang="en-US" baseline="0" dirty="0" smtClean="0"/>
+              <a:t> @body)) name))</a:t>
+            </a:r>
+            <a:endParaRPr lang="en-US" dirty="0" smtClean="0"/>
           </a:p>
         </p:txBody>
       </p:sp>
@@ -1989,6 +2017,174 @@
           <a:p>
             <a:fld id="{EBCFF49A-32B0-634D-8969-0EE12B8F37A2}" type="slidenum">
               <a:rPr lang="en-US" smtClean="0"/>
+              <a:t>37</a:t>
+            </a:fld>
+            <a:endParaRPr lang="en-US"/>
+          </a:p>
+        </p:txBody>
+      </p:sp>
+    </p:spTree>
+    <p:extLst>
+      <p:ext uri="{BB962C8B-B14F-4D97-AF65-F5344CB8AC3E}">
+        <p14:creationId xmlns:p14="http://schemas.microsoft.com/office/powerpoint/2010/main" val="1320138295"/>
+      </p:ext>
+    </p:extLst>
+  </p:cSld>
+  <p:clrMapOvr>
+    <a:masterClrMapping/>
+  </p:clrMapOvr>
+</p:notes>
+</file>
+
+<file path=ppt/notesSlides/notesSlide22.xml><?xml version="1.0" encoding="utf-8"?>
+<p:notes xmlns:a="http://schemas.openxmlformats.org/drawingml/2006/main" xmlns:r="http://schemas.openxmlformats.org/officeDocument/2006/relationships" xmlns:p="http://schemas.openxmlformats.org/presentationml/2006/main">
+  <p:cSld>
+    <p:spTree>
+      <p:nvGrpSpPr>
+        <p:cNvPr id="1" name=""/>
+        <p:cNvGrpSpPr/>
+        <p:nvPr/>
+      </p:nvGrpSpPr>
+      <p:grpSpPr>
+        <a:xfrm>
+          <a:off x="0" y="0"/>
+          <a:ext cx="0" cy="0"/>
+          <a:chOff x="0" y="0"/>
+          <a:chExt cx="0" cy="0"/>
+        </a:xfrm>
+      </p:grpSpPr>
+      <p:sp>
+        <p:nvSpPr>
+          <p:cNvPr id="2" name="Slide Image Placeholder 1"/>
+          <p:cNvSpPr>
+            <a:spLocks noGrp="1" noRot="1" noChangeAspect="1"/>
+          </p:cNvSpPr>
+          <p:nvPr>
+            <p:ph type="sldImg"/>
+          </p:nvPr>
+        </p:nvSpPr>
+        <p:spPr/>
+      </p:sp>
+      <p:sp>
+        <p:nvSpPr>
+          <p:cNvPr id="3" name="Notes Placeholder 2"/>
+          <p:cNvSpPr>
+            <a:spLocks noGrp="1"/>
+          </p:cNvSpPr>
+          <p:nvPr>
+            <p:ph type="body" idx="1"/>
+          </p:nvPr>
+        </p:nvSpPr>
+        <p:spPr/>
+        <p:txBody>
+          <a:bodyPr/>
+          <a:lstStyle/>
+          <a:p>
+            <a:endParaRPr lang="en-US" dirty="0"/>
+          </a:p>
+        </p:txBody>
+      </p:sp>
+      <p:sp>
+        <p:nvSpPr>
+          <p:cNvPr id="4" name="Slide Number Placeholder 3"/>
+          <p:cNvSpPr>
+            <a:spLocks noGrp="1"/>
+          </p:cNvSpPr>
+          <p:nvPr>
+            <p:ph type="sldNum" sz="quarter" idx="10"/>
+          </p:nvPr>
+        </p:nvSpPr>
+        <p:spPr/>
+        <p:txBody>
+          <a:bodyPr/>
+          <a:lstStyle/>
+          <a:p>
+            <a:fld id="{EBCFF49A-32B0-634D-8969-0EE12B8F37A2}" type="slidenum">
+              <a:rPr lang="en-US" smtClean="0"/>
+              <a:t>38</a:t>
+            </a:fld>
+            <a:endParaRPr lang="en-US"/>
+          </a:p>
+        </p:txBody>
+      </p:sp>
+    </p:spTree>
+    <p:extLst>
+      <p:ext uri="{BB962C8B-B14F-4D97-AF65-F5344CB8AC3E}">
+        <p14:creationId xmlns:p14="http://schemas.microsoft.com/office/powerpoint/2010/main" val="963639383"/>
+      </p:ext>
+    </p:extLst>
+  </p:cSld>
+  <p:clrMapOvr>
+    <a:masterClrMapping/>
+  </p:clrMapOvr>
+</p:notes>
+</file>
+
+<file path=ppt/notesSlides/notesSlide23.xml><?xml version="1.0" encoding="utf-8"?>
+<p:notes xmlns:a="http://schemas.openxmlformats.org/drawingml/2006/main" xmlns:r="http://schemas.openxmlformats.org/officeDocument/2006/relationships" xmlns:p="http://schemas.openxmlformats.org/presentationml/2006/main">
+  <p:cSld>
+    <p:spTree>
+      <p:nvGrpSpPr>
+        <p:cNvPr id="1" name=""/>
+        <p:cNvGrpSpPr/>
+        <p:nvPr/>
+      </p:nvGrpSpPr>
+      <p:grpSpPr>
+        <a:xfrm>
+          <a:off x="0" y="0"/>
+          <a:ext cx="0" cy="0"/>
+          <a:chOff x="0" y="0"/>
+          <a:chExt cx="0" cy="0"/>
+        </a:xfrm>
+      </p:grpSpPr>
+      <p:sp>
+        <p:nvSpPr>
+          <p:cNvPr id="2" name="Slide Image Placeholder 1"/>
+          <p:cNvSpPr>
+            <a:spLocks noGrp="1" noRot="1" noChangeAspect="1"/>
+          </p:cNvSpPr>
+          <p:nvPr>
+            <p:ph type="sldImg"/>
+          </p:nvPr>
+        </p:nvSpPr>
+        <p:spPr/>
+      </p:sp>
+      <p:sp>
+        <p:nvSpPr>
+          <p:cNvPr id="3" name="Notes Placeholder 2"/>
+          <p:cNvSpPr>
+            <a:spLocks noGrp="1"/>
+          </p:cNvSpPr>
+          <p:nvPr>
+            <p:ph type="body" idx="1"/>
+          </p:nvPr>
+        </p:nvSpPr>
+        <p:spPr/>
+        <p:txBody>
+          <a:bodyPr/>
+          <a:lstStyle/>
+          <a:p>
+            <a:endParaRPr lang="en-US" dirty="0"/>
+          </a:p>
+        </p:txBody>
+      </p:sp>
+      <p:sp>
+        <p:nvSpPr>
+          <p:cNvPr id="4" name="Slide Number Placeholder 3"/>
+          <p:cNvSpPr>
+            <a:spLocks noGrp="1"/>
+          </p:cNvSpPr>
+          <p:nvPr>
+            <p:ph type="sldNum" sz="quarter" idx="10"/>
+          </p:nvPr>
+        </p:nvSpPr>
+        <p:spPr/>
+        <p:txBody>
+          <a:bodyPr/>
+          <a:lstStyle/>
+          <a:p>
+            <a:fld id="{EBCFF49A-32B0-634D-8969-0EE12B8F37A2}" type="slidenum">
+              <a:rPr lang="en-US" smtClean="0"/>
               <a:t>47</a:t>
             </a:fld>
             <a:endParaRPr lang="en-US"/>
@@ -2008,7 +2204,7 @@
 </p:notes>
 </file>
 
-<file path=ppt/notesSlides/notesSlide22.xml><?xml version="1.0" encoding="utf-8"?>
+<file path=ppt/notesSlides/notesSlide24.xml><?xml version="1.0" encoding="utf-8"?>
 <p:notes xmlns:a="http://schemas.openxmlformats.org/drawingml/2006/main" xmlns:r="http://schemas.openxmlformats.org/officeDocument/2006/relationships" xmlns:p="http://schemas.openxmlformats.org/presentationml/2006/main">
   <p:cSld>
     <p:spTree>
@@ -2741,11 +2937,7 @@
           <a:p>
             <a:r>
               <a:rPr lang="en-US" dirty="0" smtClean="0"/>
-              <a:t>There </a:t>
-            </a:r>
-            <a:r>
-              <a:rPr lang="en-US" dirty="0" smtClean="0"/>
-              <a:t>are a couple approaches we could</a:t>
+              <a:t>There are a couple approaches we could</a:t>
             </a:r>
             <a:r>
               <a:rPr lang="en-US" baseline="0" dirty="0" smtClean="0"/>
@@ -3221,7 +3413,7 @@
           <a:p>
             <a:fld id="{9758DE6A-8CEB-2549-A674-EF3AFC467924}" type="datetime1">
               <a:rPr lang="en-US" smtClean="0"/>
-              <a:t>4/22/18</a:t>
+              <a:t>5/1/18</a:t>
             </a:fld>
             <a:endParaRPr lang="en-US"/>
           </a:p>
@@ -3403,7 +3595,7 @@
           <a:p>
             <a:fld id="{64A12329-BFC5-7D49-AB30-269F854754CA}" type="datetime1">
               <a:rPr lang="en-US" smtClean="0"/>
-              <a:t>4/22/18</a:t>
+              <a:t>5/1/18</a:t>
             </a:fld>
             <a:endParaRPr lang="en-US"/>
           </a:p>
@@ -3583,7 +3775,7 @@
           <a:p>
             <a:fld id="{5A97C89D-64A5-4A42-9790-15CFE1D1F51F}" type="datetime1">
               <a:rPr lang="en-US" smtClean="0"/>
-              <a:t>4/22/18</a:t>
+              <a:t>5/1/18</a:t>
             </a:fld>
             <a:endParaRPr lang="en-US"/>
           </a:p>
@@ -3753,7 +3945,7 @@
           <a:p>
             <a:fld id="{AD6F7633-A308-8245-97B0-A5F25EA6531D}" type="datetime1">
               <a:rPr lang="en-US" smtClean="0"/>
-              <a:t>4/22/18</a:t>
+              <a:t>5/1/18</a:t>
             </a:fld>
             <a:endParaRPr lang="en-US"/>
           </a:p>
@@ -4013,7 +4205,7 @@
           <a:p>
             <a:fld id="{6374187E-7E3D-4A46-AFDD-EAE3F92FD732}" type="datetime1">
               <a:rPr lang="en-US" smtClean="0"/>
-              <a:t>4/22/18</a:t>
+              <a:t>5/1/18</a:t>
             </a:fld>
             <a:endParaRPr lang="en-US"/>
           </a:p>
@@ -4308,7 +4500,7 @@
           <a:p>
             <a:fld id="{FA60E862-0DE3-9042-ADF9-7CC6FF01F972}" type="datetime1">
               <a:rPr lang="en-US" smtClean="0"/>
-              <a:t>4/22/18</a:t>
+              <a:t>5/1/18</a:t>
             </a:fld>
             <a:endParaRPr lang="en-US"/>
           </a:p>
@@ -4730,7 +4922,7 @@
           <a:p>
             <a:fld id="{31610DA4-15B1-3549-B4E8-7EFE3590EF63}" type="datetime1">
               <a:rPr lang="en-US" smtClean="0"/>
-              <a:t>4/22/18</a:t>
+              <a:t>5/1/18</a:t>
             </a:fld>
             <a:endParaRPr lang="en-US"/>
           </a:p>
@@ -4848,7 +5040,7 @@
           <a:p>
             <a:fld id="{8A9AAEA7-3935-4245-A301-F5292F46E381}" type="datetime1">
               <a:rPr lang="en-US" smtClean="0"/>
-              <a:t>4/22/18</a:t>
+              <a:t>5/1/18</a:t>
             </a:fld>
             <a:endParaRPr lang="en-US"/>
           </a:p>
@@ -4943,7 +5135,7 @@
           <a:p>
             <a:fld id="{90C80C8B-3BF9-624C-B1F6-2FD50C40C0FD}" type="datetime1">
               <a:rPr lang="en-US" smtClean="0"/>
-              <a:t>4/22/18</a:t>
+              <a:t>5/1/18</a:t>
             </a:fld>
             <a:endParaRPr lang="en-US"/>
           </a:p>
@@ -5227,7 +5419,7 @@
           <a:p>
             <a:fld id="{83FC20BB-6E45-F740-A042-B0A522E69F37}" type="datetime1">
               <a:rPr lang="en-US" smtClean="0"/>
-              <a:t>4/22/18</a:t>
+              <a:t>5/1/18</a:t>
             </a:fld>
             <a:endParaRPr lang="en-US"/>
           </a:p>
@@ -5480,7 +5672,7 @@
           <a:p>
             <a:fld id="{86929D33-3EFD-F846-9B56-C6BC450E26A8}" type="datetime1">
               <a:rPr lang="en-US" smtClean="0"/>
-              <a:t>4/22/18</a:t>
+              <a:t>5/1/18</a:t>
             </a:fld>
             <a:endParaRPr lang="en-US"/>
           </a:p>
@@ -5693,7 +5885,7 @@
           <a:p>
             <a:fld id="{EFABAF7B-7D2B-504B-B35B-7B7BA5D8F339}" type="datetime1">
               <a:rPr lang="en-US" smtClean="0"/>
-              <a:t>4/22/18</a:t>
+              <a:t>5/1/18</a:t>
             </a:fld>
             <a:endParaRPr lang="en-US"/>
           </a:p>
@@ -15121,11 +15313,6 @@
               </a:rPr>
               <a:t>.</a:t>
             </a:r>
-            <a:endParaRPr lang="en-US" sz="3200" dirty="0">
-              <a:solidFill>
-                <a:schemeClr val="tx1"/>
-              </a:solidFill>
-            </a:endParaRPr>
           </a:p>
         </p:txBody>
       </p:sp>
@@ -19992,15 +20179,21 @@
           <p:nvPr/>
         </p:nvPicPr>
         <p:blipFill>
-          <a:blip r:embed="rId2"/>
+          <a:blip r:embed="rId3">
+            <a:extLst>
+              <a:ext uri="{28A0092B-C50C-407E-A947-70E740481C1C}">
+                <a14:useLocalDpi xmlns:a14="http://schemas.microsoft.com/office/drawing/2010/main" val="0"/>
+              </a:ext>
+            </a:extLst>
+          </a:blip>
           <a:stretch>
             <a:fillRect/>
           </a:stretch>
         </p:blipFill>
         <p:spPr>
           <a:xfrm>
-            <a:off x="0" y="1373096"/>
-            <a:ext cx="9144000" cy="1116969"/>
+            <a:off x="-1" y="932808"/>
+            <a:ext cx="9144001" cy="1154552"/>
           </a:xfrm>
           <a:prstGeom prst="rect">
             <a:avLst/>
@@ -20015,7 +20208,7 @@
         </p:nvSpPr>
         <p:spPr>
           <a:xfrm>
-            <a:off x="871207" y="1928957"/>
+            <a:off x="871207" y="1597215"/>
             <a:ext cx="8051301" cy="855881"/>
           </a:xfrm>
           <a:prstGeom prst="rect">
@@ -20070,7 +20263,7 @@
         </p:nvSpPr>
         <p:spPr>
           <a:xfrm>
-            <a:off x="4100278" y="1161684"/>
+            <a:off x="4100278" y="741334"/>
             <a:ext cx="4955124" cy="855881"/>
           </a:xfrm>
           <a:prstGeom prst="rect">
@@ -20126,15 +20319,21 @@
           <p:nvPr/>
         </p:nvPicPr>
         <p:blipFill>
-          <a:blip r:embed="rId3"/>
+          <a:blip r:embed="rId4">
+            <a:extLst>
+              <a:ext uri="{28A0092B-C50C-407E-A947-70E740481C1C}">
+                <a14:useLocalDpi xmlns:a14="http://schemas.microsoft.com/office/drawing/2010/main" val="0"/>
+              </a:ext>
+            </a:extLst>
+          </a:blip>
           <a:stretch>
             <a:fillRect/>
           </a:stretch>
         </p:blipFill>
         <p:spPr>
           <a:xfrm>
-            <a:off x="0" y="3115266"/>
-            <a:ext cx="9144000" cy="1416405"/>
+            <a:off x="81850" y="3133066"/>
+            <a:ext cx="8980299" cy="1416405"/>
           </a:xfrm>
           <a:prstGeom prst="rect">
             <a:avLst/>
@@ -20149,7 +20348,7 @@
         </p:nvSpPr>
         <p:spPr>
           <a:xfrm>
-            <a:off x="29534" y="3580697"/>
+            <a:off x="29534" y="3598497"/>
             <a:ext cx="1432327" cy="664570"/>
           </a:xfrm>
           <a:prstGeom prst="ellipse">
@@ -20204,7 +20403,7 @@
         </p:nvSpPr>
         <p:spPr>
           <a:xfrm>
-            <a:off x="1461861" y="3201439"/>
+            <a:off x="1461861" y="3219239"/>
             <a:ext cx="3632495" cy="664570"/>
           </a:xfrm>
           <a:prstGeom prst="ellipse">
@@ -20259,7 +20458,7 @@
         </p:nvSpPr>
         <p:spPr>
           <a:xfrm>
-            <a:off x="5094356" y="2989967"/>
+            <a:off x="5094356" y="3007767"/>
             <a:ext cx="2052509" cy="664570"/>
           </a:xfrm>
           <a:prstGeom prst="ellipse">
@@ -20314,7 +20513,7 @@
         </p:nvSpPr>
         <p:spPr>
           <a:xfrm>
-            <a:off x="7623075" y="3381324"/>
+            <a:off x="7623075" y="3399124"/>
             <a:ext cx="1432327" cy="664570"/>
           </a:xfrm>
           <a:prstGeom prst="ellipse">
@@ -20369,7 +20568,7 @@
         </p:nvSpPr>
         <p:spPr>
           <a:xfrm>
-            <a:off x="1747157" y="3866009"/>
+            <a:off x="1747157" y="3883809"/>
             <a:ext cx="1432327" cy="664570"/>
           </a:xfrm>
           <a:prstGeom prst="ellipse">
@@ -20418,14 +20617,14 @@
       </p:sp>
       <p:sp>
         <p:nvSpPr>
-          <p:cNvPr id="8" name="Rectangle 7"/>
+          <p:cNvPr id="12" name="Rectangle 11"/>
           <p:cNvSpPr/>
           <p:nvPr/>
         </p:nvSpPr>
         <p:spPr>
           <a:xfrm>
             <a:off x="189935" y="251189"/>
-            <a:ext cx="3910343" cy="753278"/>
+            <a:ext cx="6268015" cy="753278"/>
           </a:xfrm>
           <a:prstGeom prst="rect">
             <a:avLst/>
@@ -20464,7 +20663,7 @@
           <a:p>
             <a:pPr algn="ctr"/>
             <a:r>
-              <a:rPr lang="en-US" sz="2800" dirty="0" smtClean="0">
+              <a:rPr lang="en-US" sz="3200" dirty="0" smtClean="0">
                 <a:solidFill>
                   <a:schemeClr val="tx1">
                     <a:lumMod val="50000"/>
@@ -20478,7 +20677,7 @@
               <a:t>e.g. </a:t>
             </a:r>
             <a:r>
-              <a:rPr lang="en-US" sz="2800" dirty="0" smtClean="0">
+              <a:rPr lang="en-US" sz="3200" dirty="0" smtClean="0">
                 <a:solidFill>
                   <a:schemeClr val="tx1">
                     <a:lumMod val="50000"/>
@@ -20489,14 +20688,14 @@
                 <a:ea typeface="Consolas" charset="0"/>
                 <a:cs typeface="Consolas" charset="0"/>
               </a:rPr>
-              <a:t>[x*x | x &lt;- l]</a:t>
+              <a:t>[x*y | x &lt;- l, y &lt;- l]</a:t>
             </a:r>
           </a:p>
         </p:txBody>
       </p:sp>
       <p:sp>
         <p:nvSpPr>
-          <p:cNvPr id="13" name="Slide Number Placeholder 12"/>
+          <p:cNvPr id="8" name="Slide Number Placeholder 7"/>
           <p:cNvSpPr>
             <a:spLocks noGrp="1"/>
           </p:cNvSpPr>
@@ -20520,7 +20719,7 @@
     </p:spTree>
     <p:extLst>
       <p:ext uri="{BB962C8B-B14F-4D97-AF65-F5344CB8AC3E}">
-        <p14:creationId xmlns:p14="http://schemas.microsoft.com/office/powerpoint/2010/main" val="3250924215"/>
+        <p14:creationId xmlns:p14="http://schemas.microsoft.com/office/powerpoint/2010/main" val="1344471199"/>
       </p:ext>
     </p:extLst>
   </p:cSld>
@@ -20561,7 +20760,7 @@
                                           </p:stCondLst>
                                         </p:cTn>
                                         <p:tgtEl>
-                                          <p:spTgt spid="8"/>
+                                          <p:spTgt spid="12"/>
                                         </p:tgtEl>
                                         <p:attrNameLst>
                                           <p:attrName>style.visibility</p:attrName>
@@ -20933,7 +21132,7 @@
       <p:bldP spid="9" grpId="0" animBg="1"/>
       <p:bldP spid="10" grpId="0" animBg="1"/>
       <p:bldP spid="11" grpId="0" animBg="1"/>
-      <p:bldP spid="8" grpId="0"/>
+      <p:bldP spid="12" grpId="0"/>
     </p:bldLst>
   </p:timing>
 </p:sld>
@@ -21170,15 +21369,21 @@
           <p:nvPr/>
         </p:nvPicPr>
         <p:blipFill>
-          <a:blip r:embed="rId2"/>
+          <a:blip r:embed="rId2">
+            <a:extLst>
+              <a:ext uri="{28A0092B-C50C-407E-A947-70E740481C1C}">
+                <a14:useLocalDpi xmlns:a14="http://schemas.microsoft.com/office/drawing/2010/main" val="0"/>
+              </a:ext>
+            </a:extLst>
+          </a:blip>
           <a:stretch>
             <a:fillRect/>
           </a:stretch>
         </p:blipFill>
         <p:spPr>
           <a:xfrm>
-            <a:off x="0" y="236063"/>
-            <a:ext cx="9144000" cy="1416405"/>
+            <a:off x="81850" y="236063"/>
+            <a:ext cx="8980299" cy="1416405"/>
           </a:xfrm>
           <a:prstGeom prst="rect">
             <a:avLst/>
@@ -21249,15 +21454,21 @@
           <p:nvPr/>
         </p:nvPicPr>
         <p:blipFill>
-          <a:blip r:embed="rId3"/>
+          <a:blip r:embed="rId3">
+            <a:extLst>
+              <a:ext uri="{28A0092B-C50C-407E-A947-70E740481C1C}">
+                <a14:useLocalDpi xmlns:a14="http://schemas.microsoft.com/office/drawing/2010/main" val="0"/>
+              </a:ext>
+            </a:extLst>
+          </a:blip>
           <a:stretch>
             <a:fillRect/>
           </a:stretch>
         </p:blipFill>
         <p:spPr>
           <a:xfrm>
-            <a:off x="0" y="2861636"/>
-            <a:ext cx="9144000" cy="1184203"/>
+            <a:off x="0" y="2832100"/>
+            <a:ext cx="9144000" cy="1386979"/>
           </a:xfrm>
           <a:prstGeom prst="rect">
             <a:avLst/>
@@ -21278,7 +21489,7 @@
         </p:nvSpPr>
         <p:spPr>
           <a:xfrm>
-            <a:off x="5891734" y="2333381"/>
+            <a:off x="5670856" y="2471744"/>
             <a:ext cx="1949144" cy="498719"/>
           </a:xfrm>
           <a:prstGeom prst="uturnArrow">
@@ -21321,7 +21532,7 @@
       </p:sp>
       <p:sp>
         <p:nvSpPr>
-          <p:cNvPr id="3" name="Slide Number Placeholder 2"/>
+          <p:cNvPr id="2" name="Slide Number Placeholder 1"/>
           <p:cNvSpPr>
             <a:spLocks noGrp="1"/>
           </p:cNvSpPr>
@@ -21345,7 +21556,7 @@
     </p:spTree>
     <p:extLst>
       <p:ext uri="{BB962C8B-B14F-4D97-AF65-F5344CB8AC3E}">
-        <p14:creationId xmlns:p14="http://schemas.microsoft.com/office/powerpoint/2010/main" val="564348803"/>
+        <p14:creationId xmlns:p14="http://schemas.microsoft.com/office/powerpoint/2010/main" val="1586240302"/>
       </p:ext>
     </p:extLst>
   </p:cSld>
@@ -21504,15 +21715,21 @@
           <p:nvPr/>
         </p:nvPicPr>
         <p:blipFill>
-          <a:blip r:embed="rId2"/>
+          <a:blip r:embed="rId3">
+            <a:extLst>
+              <a:ext uri="{28A0092B-C50C-407E-A947-70E740481C1C}">
+                <a14:useLocalDpi xmlns:a14="http://schemas.microsoft.com/office/drawing/2010/main" val="0"/>
+              </a:ext>
+            </a:extLst>
+          </a:blip>
           <a:stretch>
             <a:fillRect/>
           </a:stretch>
         </p:blipFill>
         <p:spPr>
           <a:xfrm>
-            <a:off x="0" y="236065"/>
-            <a:ext cx="9144000" cy="1416405"/>
+            <a:off x="81850" y="236065"/>
+            <a:ext cx="8980299" cy="1416405"/>
           </a:xfrm>
           <a:prstGeom prst="rect">
             <a:avLst/>
@@ -21684,194 +21901,66 @@
           </a:p>
         </p:txBody>
       </p:sp>
-      <p:grpSp>
-        <p:nvGrpSpPr>
-          <p:cNvPr id="17" name="Group 16"/>
-          <p:cNvGrpSpPr/>
+      <p:pic>
+        <p:nvPicPr>
+          <p:cNvPr id="12" name="Picture 11"/>
+          <p:cNvPicPr>
+            <a:picLocks noChangeAspect="1"/>
+          </p:cNvPicPr>
           <p:nvPr/>
-        </p:nvGrpSpPr>
-        <p:grpSpPr>
+        </p:nvPicPr>
+        <p:blipFill>
+          <a:blip r:embed="rId4">
+            <a:extLst>
+              <a:ext uri="{28A0092B-C50C-407E-A947-70E740481C1C}">
+                <a14:useLocalDpi xmlns:a14="http://schemas.microsoft.com/office/drawing/2010/main" val="0"/>
+              </a:ext>
+            </a:extLst>
+          </a:blip>
+          <a:stretch>
+            <a:fillRect/>
+          </a:stretch>
+        </p:blipFill>
+        <p:spPr>
           <a:xfrm>
-            <a:off x="1965264" y="2146850"/>
-            <a:ext cx="5181601" cy="939800"/>
-            <a:chOff x="1965264" y="2146850"/>
-            <a:chExt cx="5181601" cy="939800"/>
+            <a:off x="1760186" y="2108011"/>
+            <a:ext cx="5623625" cy="1226204"/>
           </a:xfrm>
-        </p:grpSpPr>
-        <p:pic>
-          <p:nvPicPr>
-            <p:cNvPr id="12" name="Picture 11"/>
-            <p:cNvPicPr>
-              <a:picLocks noChangeAspect="1"/>
-            </p:cNvPicPr>
-            <p:nvPr/>
-          </p:nvPicPr>
-          <p:blipFill>
-            <a:blip r:embed="rId3"/>
-            <a:stretch>
-              <a:fillRect/>
-            </a:stretch>
-          </p:blipFill>
-          <p:spPr>
-            <a:xfrm>
-              <a:off x="1965265" y="2146850"/>
-              <a:ext cx="5181600" cy="939800"/>
-            </a:xfrm>
-            <a:prstGeom prst="rect">
-              <a:avLst/>
-            </a:prstGeom>
-          </p:spPr>
-        </p:pic>
-        <p:sp>
-          <p:nvSpPr>
-            <p:cNvPr id="14" name="Rectangle 13"/>
-            <p:cNvSpPr/>
-            <p:nvPr/>
-          </p:nvSpPr>
-          <p:spPr>
-            <a:xfrm>
-              <a:off x="1965264" y="2835501"/>
-              <a:ext cx="2184051" cy="251149"/>
-            </a:xfrm>
-            <a:prstGeom prst="rect">
-              <a:avLst/>
-            </a:prstGeom>
-            <a:solidFill>
-              <a:schemeClr val="bg1"/>
-            </a:solidFill>
-            <a:ln>
-              <a:solidFill>
-                <a:schemeClr val="bg1"/>
-              </a:solidFill>
-            </a:ln>
-            <a:effectLst/>
-          </p:spPr>
-          <p:style>
-            <a:lnRef idx="1">
-              <a:schemeClr val="accent1"/>
-            </a:lnRef>
-            <a:fillRef idx="3">
-              <a:schemeClr val="accent1"/>
-            </a:fillRef>
-            <a:effectRef idx="2">
-              <a:schemeClr val="accent1"/>
-            </a:effectRef>
-            <a:fontRef idx="minor">
-              <a:schemeClr val="lt1"/>
-            </a:fontRef>
-          </p:style>
-          <p:txBody>
-            <a:bodyPr rot="0" spcFirstLastPara="0" vertOverflow="overflow" horzOverflow="overflow" vert="horz" wrap="square" lIns="91440" tIns="45720" rIns="91440" bIns="45720" numCol="1" spcCol="0" rtlCol="0" fromWordArt="0" anchor="ctr" anchorCtr="0" forceAA="0" compatLnSpc="1">
-              <a:prstTxWarp prst="textNoShape">
-                <a:avLst/>
-              </a:prstTxWarp>
-              <a:noAutofit/>
-            </a:bodyPr>
-            <a:lstStyle/>
-            <a:p>
-              <a:pPr algn="ctr"/>
-              <a:endParaRPr lang="en-US" dirty="0" smtClean="0">
-                <a:latin typeface="Avenir Book"/>
-                <a:cs typeface="Avenir Book"/>
-              </a:endParaRPr>
-            </a:p>
-          </p:txBody>
-        </p:sp>
-      </p:grpSp>
-      <p:grpSp>
-        <p:nvGrpSpPr>
-          <p:cNvPr id="16" name="Group 15"/>
-          <p:cNvGrpSpPr/>
+          <a:prstGeom prst="rect">
+            <a:avLst/>
+          </a:prstGeom>
+        </p:spPr>
+      </p:pic>
+      <p:pic>
+        <p:nvPicPr>
+          <p:cNvPr id="13" name="Picture 12"/>
+          <p:cNvPicPr>
+            <a:picLocks noChangeAspect="1"/>
+          </p:cNvPicPr>
           <p:nvPr/>
-        </p:nvGrpSpPr>
-        <p:grpSpPr>
+        </p:nvPicPr>
+        <p:blipFill>
+          <a:blip r:embed="rId5">
+            <a:extLst>
+              <a:ext uri="{28A0092B-C50C-407E-A947-70E740481C1C}">
+                <a14:useLocalDpi xmlns:a14="http://schemas.microsoft.com/office/drawing/2010/main" val="0"/>
+              </a:ext>
+            </a:extLst>
+          </a:blip>
+          <a:stretch>
+            <a:fillRect/>
+          </a:stretch>
+        </p:blipFill>
+        <p:spPr>
           <a:xfrm>
-            <a:off x="825500" y="3525564"/>
-            <a:ext cx="7493000" cy="990600"/>
-            <a:chOff x="825500" y="3525564"/>
-            <a:chExt cx="7493000" cy="990600"/>
+            <a:off x="926035" y="3465475"/>
+            <a:ext cx="7682616" cy="1170291"/>
           </a:xfrm>
-        </p:grpSpPr>
-        <p:pic>
-          <p:nvPicPr>
-            <p:cNvPr id="13" name="Picture 12"/>
-            <p:cNvPicPr>
-              <a:picLocks noChangeAspect="1"/>
-            </p:cNvPicPr>
-            <p:nvPr/>
-          </p:nvPicPr>
-          <p:blipFill>
-            <a:blip r:embed="rId4"/>
-            <a:stretch>
-              <a:fillRect/>
-            </a:stretch>
-          </p:blipFill>
-          <p:spPr>
-            <a:xfrm>
-              <a:off x="825500" y="3525564"/>
-              <a:ext cx="7493000" cy="990600"/>
-            </a:xfrm>
-            <a:prstGeom prst="rect">
-              <a:avLst/>
-            </a:prstGeom>
-          </p:spPr>
-        </p:pic>
-        <p:sp>
-          <p:nvSpPr>
-            <p:cNvPr id="15" name="Rectangle 14"/>
-            <p:cNvSpPr/>
-            <p:nvPr/>
-          </p:nvSpPr>
-          <p:spPr>
-            <a:xfrm>
-              <a:off x="825500" y="4277040"/>
-              <a:ext cx="636361" cy="239124"/>
-            </a:xfrm>
-            <a:prstGeom prst="rect">
-              <a:avLst/>
-            </a:prstGeom>
-            <a:solidFill>
-              <a:schemeClr val="bg1"/>
-            </a:solidFill>
-            <a:ln>
-              <a:solidFill>
-                <a:schemeClr val="bg1"/>
-              </a:solidFill>
-            </a:ln>
-            <a:effectLst/>
-          </p:spPr>
-          <p:style>
-            <a:lnRef idx="1">
-              <a:schemeClr val="accent1"/>
-            </a:lnRef>
-            <a:fillRef idx="3">
-              <a:schemeClr val="accent1"/>
-            </a:fillRef>
-            <a:effectRef idx="2">
-              <a:schemeClr val="accent1"/>
-            </a:effectRef>
-            <a:fontRef idx="minor">
-              <a:schemeClr val="lt1"/>
-            </a:fontRef>
-          </p:style>
-          <p:txBody>
-            <a:bodyPr rot="0" spcFirstLastPara="0" vertOverflow="overflow" horzOverflow="overflow" vert="horz" wrap="square" lIns="91440" tIns="45720" rIns="91440" bIns="45720" numCol="1" spcCol="0" rtlCol="0" fromWordArt="0" anchor="ctr" anchorCtr="0" forceAA="0" compatLnSpc="1">
-              <a:prstTxWarp prst="textNoShape">
-                <a:avLst/>
-              </a:prstTxWarp>
-              <a:noAutofit/>
-            </a:bodyPr>
-            <a:lstStyle/>
-            <a:p>
-              <a:pPr algn="ctr"/>
-              <a:endParaRPr lang="en-US" dirty="0" smtClean="0">
-                <a:latin typeface="Avenir Book"/>
-                <a:cs typeface="Avenir Book"/>
-              </a:endParaRPr>
-            </a:p>
-          </p:txBody>
-        </p:sp>
-      </p:grpSp>
+          <a:prstGeom prst="rect">
+            <a:avLst/>
+          </a:prstGeom>
+        </p:spPr>
+      </p:pic>
       <p:pic>
         <p:nvPicPr>
           <p:cNvPr id="18" name="Picture 17"/>
@@ -21881,15 +21970,21 @@
           <p:nvPr/>
         </p:nvPicPr>
         <p:blipFill>
-          <a:blip r:embed="rId5"/>
+          <a:blip r:embed="rId6">
+            <a:extLst>
+              <a:ext uri="{28A0092B-C50C-407E-A947-70E740481C1C}">
+                <a14:useLocalDpi xmlns:a14="http://schemas.microsoft.com/office/drawing/2010/main" val="0"/>
+              </a:ext>
+            </a:extLst>
+          </a:blip>
           <a:stretch>
             <a:fillRect/>
           </a:stretch>
         </p:blipFill>
         <p:spPr>
           <a:xfrm>
-            <a:off x="2603500" y="4899656"/>
-            <a:ext cx="3937000" cy="1193800"/>
+            <a:off x="1379837" y="5147220"/>
+            <a:ext cx="6240163" cy="1015840"/>
           </a:xfrm>
           <a:prstGeom prst="rect">
             <a:avLst/>
@@ -21903,89 +21998,7 @@
       </p:pic>
       <p:sp>
         <p:nvSpPr>
-          <p:cNvPr id="21" name="Bent-Up Arrow 20"/>
-          <p:cNvSpPr/>
-          <p:nvPr/>
-        </p:nvSpPr>
-        <p:spPr>
-          <a:xfrm flipH="1">
-            <a:off x="5493046" y="6093456"/>
-            <a:ext cx="766899" cy="537482"/>
-          </a:xfrm>
-          <a:prstGeom prst="bentUpArrow">
-            <a:avLst/>
-          </a:prstGeom>
-        </p:spPr>
-        <p:style>
-          <a:lnRef idx="1">
-            <a:schemeClr val="accent6"/>
-          </a:lnRef>
-          <a:fillRef idx="3">
-            <a:schemeClr val="accent6"/>
-          </a:fillRef>
-          <a:effectRef idx="2">
-            <a:schemeClr val="accent6"/>
-          </a:effectRef>
-          <a:fontRef idx="minor">
-            <a:schemeClr val="lt1"/>
-          </a:fontRef>
-        </p:style>
-        <p:txBody>
-          <a:bodyPr rot="0" spcFirstLastPara="0" vertOverflow="overflow" horzOverflow="overflow" vert="horz" wrap="square" lIns="91440" tIns="45720" rIns="91440" bIns="45720" numCol="1" spcCol="0" rtlCol="0" fromWordArt="0" anchor="ctr" anchorCtr="0" forceAA="0" compatLnSpc="1">
-            <a:prstTxWarp prst="textNoShape">
-              <a:avLst/>
-            </a:prstTxWarp>
-            <a:noAutofit/>
-          </a:bodyPr>
-          <a:lstStyle/>
-          <a:p>
-            <a:pPr algn="ctr"/>
-            <a:endParaRPr lang="en-US" dirty="0" smtClean="0">
-              <a:latin typeface="Avenir Book"/>
-              <a:cs typeface="Avenir Book"/>
-            </a:endParaRPr>
-          </a:p>
-        </p:txBody>
-      </p:sp>
-      <p:sp>
-        <p:nvSpPr>
-          <p:cNvPr id="23" name="TextBox 22"/>
-          <p:cNvSpPr txBox="1"/>
-          <p:nvPr/>
-        </p:nvSpPr>
-        <p:spPr>
-          <a:xfrm>
-            <a:off x="6349487" y="6365110"/>
-            <a:ext cx="1885880" cy="369332"/>
-          </a:xfrm>
-          <a:prstGeom prst="rect">
-            <a:avLst/>
-          </a:prstGeom>
-          <a:noFill/>
-        </p:spPr>
-        <p:txBody>
-          <a:bodyPr wrap="none" rtlCol="0">
-            <a:spAutoFit/>
-          </a:bodyPr>
-          <a:lstStyle/>
-          <a:p>
-            <a:r>
-              <a:rPr lang="en-US" dirty="0" smtClean="0">
-                <a:latin typeface="Avenir Book"/>
-                <a:cs typeface="Avenir Book"/>
-              </a:rPr>
-              <a:t>any surface term</a:t>
-            </a:r>
-            <a:endParaRPr lang="en-US" dirty="0">
-              <a:latin typeface="Avenir Book"/>
-              <a:cs typeface="Avenir Book"/>
-            </a:endParaRPr>
-          </a:p>
-        </p:txBody>
-      </p:sp>
-      <p:sp>
-        <p:nvSpPr>
-          <p:cNvPr id="3" name="Slide Number Placeholder 2"/>
+          <p:cNvPr id="2" name="Slide Number Placeholder 1"/>
           <p:cNvSpPr>
             <a:spLocks noGrp="1"/>
           </p:cNvSpPr>
@@ -22009,7 +22022,7 @@
     </p:spTree>
     <p:extLst>
       <p:ext uri="{BB962C8B-B14F-4D97-AF65-F5344CB8AC3E}">
-        <p14:creationId xmlns:p14="http://schemas.microsoft.com/office/powerpoint/2010/main" val="3857836295"/>
+        <p14:creationId xmlns:p14="http://schemas.microsoft.com/office/powerpoint/2010/main" val="1078761856"/>
       </p:ext>
     </p:extLst>
   </p:cSld>
@@ -22050,151 +22063,7 @@
                                           </p:stCondLst>
                                         </p:cTn>
                                         <p:tgtEl>
-                                          <p:spTgt spid="17"/>
-                                        </p:tgtEl>
-                                        <p:attrNameLst>
-                                          <p:attrName>style.visibility</p:attrName>
-                                        </p:attrNameLst>
-                                      </p:cBhvr>
-                                      <p:to>
-                                        <p:strVal val="visible"/>
-                                      </p:to>
-                                    </p:set>
-                                  </p:childTnLst>
-                                </p:cTn>
-                              </p:par>
-                            </p:childTnLst>
-                          </p:cTn>
-                        </p:par>
-                      </p:childTnLst>
-                    </p:cTn>
-                  </p:par>
-                  <p:par>
-                    <p:cTn id="7" fill="hold">
-                      <p:stCondLst>
-                        <p:cond delay="indefinite"/>
-                      </p:stCondLst>
-                      <p:childTnLst>
-                        <p:par>
-                          <p:cTn id="8" fill="hold">
-                            <p:stCondLst>
-                              <p:cond delay="0"/>
-                            </p:stCondLst>
-                            <p:childTnLst>
-                              <p:par>
-                                <p:cTn id="9" presetID="1" presetClass="entr" presetSubtype="0" fill="hold" nodeType="clickEffect">
-                                  <p:stCondLst>
-                                    <p:cond delay="0"/>
-                                  </p:stCondLst>
-                                  <p:childTnLst>
-                                    <p:set>
-                                      <p:cBhvr>
-                                        <p:cTn id="10" dur="1" fill="hold">
-                                          <p:stCondLst>
-                                            <p:cond delay="0"/>
-                                          </p:stCondLst>
-                                        </p:cTn>
-                                        <p:tgtEl>
-                                          <p:spTgt spid="16"/>
-                                        </p:tgtEl>
-                                        <p:attrNameLst>
-                                          <p:attrName>style.visibility</p:attrName>
-                                        </p:attrNameLst>
-                                      </p:cBhvr>
-                                      <p:to>
-                                        <p:strVal val="visible"/>
-                                      </p:to>
-                                    </p:set>
-                                  </p:childTnLst>
-                                </p:cTn>
-                              </p:par>
-                            </p:childTnLst>
-                          </p:cTn>
-                        </p:par>
-                      </p:childTnLst>
-                    </p:cTn>
-                  </p:par>
-                  <p:par>
-                    <p:cTn id="11" fill="hold">
-                      <p:stCondLst>
-                        <p:cond delay="indefinite"/>
-                      </p:stCondLst>
-                      <p:childTnLst>
-                        <p:par>
-                          <p:cTn id="12" fill="hold">
-                            <p:stCondLst>
-                              <p:cond delay="0"/>
-                            </p:stCondLst>
-                            <p:childTnLst>
-                              <p:par>
-                                <p:cTn id="13" presetID="1" presetClass="entr" presetSubtype="0" fill="hold" nodeType="clickEffect">
-                                  <p:stCondLst>
-                                    <p:cond delay="0"/>
-                                  </p:stCondLst>
-                                  <p:childTnLst>
-                                    <p:set>
-                                      <p:cBhvr>
-                                        <p:cTn id="14" dur="1" fill="hold">
-                                          <p:stCondLst>
-                                            <p:cond delay="0"/>
-                                          </p:stCondLst>
-                                        </p:cTn>
-                                        <p:tgtEl>
                                           <p:spTgt spid="18"/>
-                                        </p:tgtEl>
-                                        <p:attrNameLst>
-                                          <p:attrName>style.visibility</p:attrName>
-                                        </p:attrNameLst>
-                                      </p:cBhvr>
-                                      <p:to>
-                                        <p:strVal val="visible"/>
-                                      </p:to>
-                                    </p:set>
-                                  </p:childTnLst>
-                                </p:cTn>
-                              </p:par>
-                              <p:par>
-                                <p:cTn id="15" presetID="1" presetClass="entr" presetSubtype="0" fill="hold" grpId="0" nodeType="withEffect">
-                                  <p:stCondLst>
-                                    <p:cond delay="0"/>
-                                  </p:stCondLst>
-                                  <p:childTnLst>
-                                    <p:set>
-                                      <p:cBhvr>
-                                        <p:cTn id="16" dur="1" fill="hold">
-                                          <p:stCondLst>
-                                            <p:cond delay="0"/>
-                                          </p:stCondLst>
-                                        </p:cTn>
-                                        <p:tgtEl>
-                                          <p:spTgt spid="23"/>
-                                        </p:tgtEl>
-                                        <p:attrNameLst>
-                                          <p:attrName>style.visibility</p:attrName>
-                                        </p:attrNameLst>
-                                      </p:cBhvr>
-                                      <p:to>
-                                        <p:strVal val="visible"/>
-                                      </p:to>
-                                    </p:set>
-                                  </p:childTnLst>
-                                </p:cTn>
-                              </p:par>
-                              <p:par>
-                                <p:cTn id="17" presetID="1" presetClass="entr" presetSubtype="0" fill="hold" grpId="0" nodeType="withEffect">
-                                  <p:stCondLst>
-                                    <p:cond delay="0"/>
-                                  </p:stCondLst>
-                                  <p:childTnLst>
-                                    <p:set>
-                                      <p:cBhvr>
-                                        <p:cTn id="18" dur="1" fill="hold">
-                                          <p:stCondLst>
-                                            <p:cond delay="0"/>
-                                          </p:stCondLst>
-                                        </p:cTn>
-                                        <p:tgtEl>
-                                          <p:spTgt spid="21"/>
                                         </p:tgtEl>
                                         <p:attrNameLst>
                                           <p:attrName>style.visibility</p:attrName>
@@ -22234,10 +22103,6 @@
         </p:cTn>
       </p:par>
     </p:tnLst>
-    <p:bldLst>
-      <p:bldP spid="21" grpId="0" animBg="1"/>
-      <p:bldP spid="23" grpId="0"/>
-    </p:bldLst>
   </p:timing>
 </p:sld>
 </file>
@@ -22292,15 +22157,21 @@
           <p:nvPr/>
         </p:nvPicPr>
         <p:blipFill>
-          <a:blip r:embed="rId3"/>
+          <a:blip r:embed="rId3">
+            <a:extLst>
+              <a:ext uri="{28A0092B-C50C-407E-A947-70E740481C1C}">
+                <a14:useLocalDpi xmlns:a14="http://schemas.microsoft.com/office/drawing/2010/main" val="0"/>
+              </a:ext>
+            </a:extLst>
+          </a:blip>
           <a:stretch>
             <a:fillRect/>
           </a:stretch>
         </p:blipFill>
         <p:spPr>
           <a:xfrm>
-            <a:off x="0" y="2658066"/>
-            <a:ext cx="9144000" cy="1416405"/>
+            <a:off x="81850" y="2658066"/>
+            <a:ext cx="8980299" cy="1416405"/>
           </a:xfrm>
           <a:prstGeom prst="rect">
             <a:avLst/>
@@ -22309,7 +22180,7 @@
       </p:pic>
       <p:pic>
         <p:nvPicPr>
-          <p:cNvPr id="4" name="Picture 3" descr="unnamed.png"/>
+          <p:cNvPr id="4" name="Picture 3"/>
           <p:cNvPicPr>
             <a:picLocks noChangeAspect="1"/>
           </p:cNvPicPr>
@@ -22329,8 +22200,8 @@
         </p:blipFill>
         <p:spPr>
           <a:xfrm>
-            <a:off x="323850" y="4781550"/>
-            <a:ext cx="8496300" cy="1384300"/>
+            <a:off x="1051582" y="4781550"/>
+            <a:ext cx="7040836" cy="1384300"/>
           </a:xfrm>
           <a:prstGeom prst="rect">
             <a:avLst/>
@@ -22339,7 +22210,7 @@
       </p:pic>
       <p:sp>
         <p:nvSpPr>
-          <p:cNvPr id="6" name="Slide Number Placeholder 5"/>
+          <p:cNvPr id="3" name="Slide Number Placeholder 2"/>
           <p:cNvSpPr>
             <a:spLocks noGrp="1"/>
           </p:cNvSpPr>
@@ -22363,7 +22234,7 @@
     </p:spTree>
     <p:extLst>
       <p:ext uri="{BB962C8B-B14F-4D97-AF65-F5344CB8AC3E}">
-        <p14:creationId xmlns:p14="http://schemas.microsoft.com/office/powerpoint/2010/main" val="1650695777"/>
+        <p14:creationId xmlns:p14="http://schemas.microsoft.com/office/powerpoint/2010/main" val="1012445788"/>
       </p:ext>
     </p:extLst>
   </p:cSld>
@@ -22474,15 +22345,21 @@
           <p:nvPr/>
         </p:nvPicPr>
         <p:blipFill>
-          <a:blip r:embed="rId2"/>
+          <a:blip r:embed="rId2">
+            <a:extLst>
+              <a:ext uri="{28A0092B-C50C-407E-A947-70E740481C1C}">
+                <a14:useLocalDpi xmlns:a14="http://schemas.microsoft.com/office/drawing/2010/main" val="0"/>
+              </a:ext>
+            </a:extLst>
+          </a:blip>
           <a:stretch>
             <a:fillRect/>
           </a:stretch>
         </p:blipFill>
         <p:spPr>
           <a:xfrm>
-            <a:off x="136083" y="246259"/>
-            <a:ext cx="6034821" cy="1333473"/>
+            <a:off x="375425" y="246259"/>
+            <a:ext cx="5556137" cy="1333473"/>
           </a:xfrm>
           <a:prstGeom prst="rect">
             <a:avLst/>
@@ -22512,15 +22389,21 @@
           <p:nvPr/>
         </p:nvPicPr>
         <p:blipFill>
-          <a:blip r:embed="rId3"/>
+          <a:blip r:embed="rId3">
+            <a:extLst>
+              <a:ext uri="{28A0092B-C50C-407E-A947-70E740481C1C}">
+                <a14:useLocalDpi xmlns:a14="http://schemas.microsoft.com/office/drawing/2010/main" val="0"/>
+              </a:ext>
+            </a:extLst>
+          </a:blip>
           <a:stretch>
             <a:fillRect/>
           </a:stretch>
         </p:blipFill>
         <p:spPr>
           <a:xfrm>
-            <a:off x="136083" y="3296988"/>
-            <a:ext cx="8862312" cy="1657523"/>
+            <a:off x="136083" y="3346165"/>
+            <a:ext cx="8862312" cy="1559168"/>
           </a:xfrm>
           <a:prstGeom prst="rect">
             <a:avLst/>
@@ -22550,15 +22433,21 @@
           <p:nvPr/>
         </p:nvPicPr>
         <p:blipFill>
-          <a:blip r:embed="rId4"/>
+          <a:blip r:embed="rId4">
+            <a:extLst>
+              <a:ext uri="{28A0092B-C50C-407E-A947-70E740481C1C}">
+                <a14:useLocalDpi xmlns:a14="http://schemas.microsoft.com/office/drawing/2010/main" val="0"/>
+              </a:ext>
+            </a:extLst>
+          </a:blip>
           <a:stretch>
             <a:fillRect/>
           </a:stretch>
         </p:blipFill>
         <p:spPr>
           <a:xfrm>
-            <a:off x="4159694" y="2076410"/>
-            <a:ext cx="4838700" cy="723900"/>
+            <a:off x="4325221" y="2076410"/>
+            <a:ext cx="4507646" cy="723900"/>
           </a:xfrm>
           <a:prstGeom prst="rect">
             <a:avLst/>
@@ -22588,15 +22477,21 @@
           <p:nvPr/>
         </p:nvPicPr>
         <p:blipFill>
-          <a:blip r:embed="rId5"/>
+          <a:blip r:embed="rId5">
+            <a:extLst>
+              <a:ext uri="{28A0092B-C50C-407E-A947-70E740481C1C}">
+                <a14:useLocalDpi xmlns:a14="http://schemas.microsoft.com/office/drawing/2010/main" val="0"/>
+              </a:ext>
+            </a:extLst>
+          </a:blip>
           <a:stretch>
             <a:fillRect/>
           </a:stretch>
         </p:blipFill>
         <p:spPr>
           <a:xfrm>
-            <a:off x="3562794" y="5451188"/>
-            <a:ext cx="5435600" cy="914400"/>
+            <a:off x="3562794" y="5490015"/>
+            <a:ext cx="5435600" cy="836745"/>
           </a:xfrm>
           <a:prstGeom prst="rect">
             <a:avLst/>
@@ -22619,7 +22514,7 @@
       </p:pic>
       <p:sp>
         <p:nvSpPr>
-          <p:cNvPr id="7" name="Slide Number Placeholder 6"/>
+          <p:cNvPr id="2" name="Slide Number Placeholder 1"/>
           <p:cNvSpPr>
             <a:spLocks noGrp="1"/>
           </p:cNvSpPr>
@@ -22643,7 +22538,7 @@
     </p:spTree>
     <p:extLst>
       <p:ext uri="{BB962C8B-B14F-4D97-AF65-F5344CB8AC3E}">
-        <p14:creationId xmlns:p14="http://schemas.microsoft.com/office/powerpoint/2010/main" val="593161451"/>
+        <p14:creationId xmlns:p14="http://schemas.microsoft.com/office/powerpoint/2010/main" val="1663423735"/>
       </p:ext>
     </p:extLst>
   </p:cSld>
@@ -23639,11 +23534,7 @@
             </a:r>
             <a:r>
               <a:rPr lang="en-US" dirty="0" smtClean="0"/>
-              <a:t> is </a:t>
-            </a:r>
-            <a:r>
-              <a:rPr lang="en-US" dirty="0" smtClean="0"/>
-              <a:t>bound to the function.</a:t>
+              <a:t> is bound to the function.</a:t>
             </a:r>
             <a:endParaRPr lang="en-US" dirty="0"/>
           </a:p>
@@ -23761,15 +23652,25 @@
                 <a:latin typeface="Avenir Book"/>
                 <a:cs typeface="Avenir Book"/>
               </a:rPr>
-              <a:t> </a:t>
+              <a:t> shadows </a:t>
+            </a:r>
+            <a:r>
+              <a:rPr lang="en-US" sz="2800" u="sng" dirty="0" smtClean="0">
+                <a:latin typeface="Avenir Book"/>
+                <a:cs typeface="Avenir Book"/>
+              </a:rPr>
+              <a:t>x</a:t>
             </a:r>
             <a:r>
               <a:rPr lang="en-US" sz="2800" dirty="0" smtClean="0">
                 <a:latin typeface="Avenir Book"/>
                 <a:cs typeface="Avenir Book"/>
               </a:rPr>
-              <a:t>shadows </a:t>
-            </a:r>
+              <a:t>?</a:t>
+            </a:r>
+          </a:p>
+          <a:p>
+            <a:pPr algn="ctr"/>
             <a:r>
               <a:rPr lang="en-US" sz="2800" u="sng" dirty="0" smtClean="0">
                 <a:latin typeface="Avenir Book"/>
@@ -23782,43 +23683,22 @@
                 <a:latin typeface="Avenir Book"/>
                 <a:cs typeface="Avenir Book"/>
               </a:rPr>
+              <a:t> shadows </a:t>
+            </a:r>
+            <a:r>
+              <a:rPr lang="en-US" sz="2800" u="sng" dirty="0" smtClean="0">
+                <a:latin typeface="Avenir Book"/>
+                <a:cs typeface="Avenir Book"/>
+              </a:rPr>
+              <a:t>f</a:t>
+            </a:r>
+            <a:r>
+              <a:rPr lang="en-US" sz="2800" dirty="0" smtClean="0">
+                <a:latin typeface="Avenir Book"/>
+                <a:cs typeface="Avenir Book"/>
+              </a:rPr>
               <a:t>?</a:t>
             </a:r>
-          </a:p>
-          <a:p>
-            <a:pPr algn="ctr"/>
-            <a:r>
-              <a:rPr lang="en-US" sz="2800" u="sng" dirty="0" smtClean="0">
-                <a:latin typeface="Avenir Book"/>
-                <a:cs typeface="Avenir Book"/>
-              </a:rPr>
-              <a:t>x</a:t>
-            </a:r>
-            <a:r>
-              <a:rPr lang="en-US" sz="2800" dirty="0" smtClean="0">
-                <a:latin typeface="Avenir Book"/>
-                <a:cs typeface="Avenir Book"/>
-              </a:rPr>
-              <a:t> shadows </a:t>
-            </a:r>
-            <a:r>
-              <a:rPr lang="en-US" sz="2800" u="sng" dirty="0" smtClean="0">
-                <a:latin typeface="Avenir Book"/>
-                <a:cs typeface="Avenir Book"/>
-              </a:rPr>
-              <a:t>f</a:t>
-            </a:r>
-            <a:r>
-              <a:rPr lang="en-US" sz="2800" dirty="0" smtClean="0">
-                <a:latin typeface="Avenir Book"/>
-                <a:cs typeface="Avenir Book"/>
-              </a:rPr>
-              <a:t>?</a:t>
-            </a:r>
-            <a:endParaRPr lang="en-US" sz="2800" dirty="0" smtClean="0">
-              <a:latin typeface="Avenir Book"/>
-              <a:cs typeface="Avenir Book"/>
-            </a:endParaRPr>
           </a:p>
         </p:txBody>
       </p:sp>
@@ -24957,14 +24837,6 @@
               </a:rPr>
               <a:t>) body)</a:t>
             </a:r>
-            <a:endParaRPr lang="en-US" sz="3200" dirty="0" smtClean="0">
-              <a:solidFill>
-                <a:schemeClr val="tx2"/>
-              </a:solidFill>
-              <a:latin typeface="Consolas" charset="0"/>
-              <a:ea typeface="Consolas" charset="0"/>
-              <a:cs typeface="Consolas" charset="0"/>
-            </a:endParaRPr>
           </a:p>
         </p:txBody>
       </p:sp>
@@ -25293,8 +25165,14 @@
                 <a:ea typeface="Consolas" charset="0"/>
                 <a:cs typeface="Consolas" charset="0"/>
               </a:rPr>
-              <a:t>(named-lambda f (x ...) body</a:t>
-            </a:r>
+              <a:t>(named-lambda f (x ...) body)</a:t>
+            </a:r>
+          </a:p>
+          <a:p>
+            <a:pPr marL="457200" indent="-457200">
+              <a:buFont typeface="Symbol" charset="2"/>
+              <a:buChar char="Þ"/>
+            </a:pPr>
             <a:r>
               <a:rPr lang="en-US" sz="2800" dirty="0" smtClean="0">
                 <a:solidFill>
@@ -25304,54 +25182,7 @@
                 <a:ea typeface="Consolas" charset="0"/>
                 <a:cs typeface="Consolas" charset="0"/>
               </a:rPr>
-              <a:t>)</a:t>
-            </a:r>
-            <a:endParaRPr lang="en-US" sz="2800" dirty="0" smtClean="0">
-              <a:solidFill>
-                <a:schemeClr val="tx2"/>
-              </a:solidFill>
-              <a:latin typeface="Consolas" charset="0"/>
-              <a:ea typeface="Consolas" charset="0"/>
-              <a:cs typeface="Consolas" charset="0"/>
-            </a:endParaRPr>
-          </a:p>
-          <a:p>
-            <a:pPr marL="457200" indent="-457200">
-              <a:buFont typeface="Symbol" charset="2"/>
-              <a:buChar char="Þ"/>
-            </a:pPr>
-            <a:r>
-              <a:rPr lang="en-US" sz="2800" dirty="0" smtClean="0">
-                <a:solidFill>
-                  <a:schemeClr val="tx2"/>
-                </a:solidFill>
-                <a:latin typeface="Consolas" charset="0"/>
-                <a:ea typeface="Consolas" charset="0"/>
-                <a:cs typeface="Consolas" charset="0"/>
-              </a:rPr>
-              <a:t>               (</a:t>
-            </a:r>
-            <a:r>
-              <a:rPr lang="en-US" sz="2800" dirty="0" smtClean="0">
-                <a:solidFill>
-                  <a:schemeClr val="tx2"/>
-                </a:solidFill>
-                <a:latin typeface="Consolas" charset="0"/>
-                <a:ea typeface="Consolas" charset="0"/>
-                <a:cs typeface="Consolas" charset="0"/>
-              </a:rPr>
-              <a:t>lambda (x ...) body</a:t>
-            </a:r>
-            <a:r>
-              <a:rPr lang="en-US" sz="2800" dirty="0" smtClean="0">
-                <a:solidFill>
-                  <a:schemeClr val="tx2"/>
-                </a:solidFill>
-                <a:latin typeface="Consolas" charset="0"/>
-                <a:ea typeface="Consolas" charset="0"/>
-                <a:cs typeface="Consolas" charset="0"/>
-              </a:rPr>
-              <a:t>)</a:t>
+              <a:t>               (lambda (x ...) body)</a:t>
             </a:r>
             <a:endParaRPr lang="en-US" sz="2800" dirty="0">
               <a:solidFill>
@@ -26816,8 +26647,14 @@
                 <a:ea typeface="Consolas" charset="0"/>
                 <a:cs typeface="Consolas" charset="0"/>
               </a:rPr>
-              <a:t>(named-lambda f (x ...) body</a:t>
-            </a:r>
+              <a:t>(named-lambda f (x ...) body)</a:t>
+            </a:r>
+          </a:p>
+          <a:p>
+            <a:pPr marL="457200" indent="-457200">
+              <a:buFont typeface="Symbol" charset="2"/>
+              <a:buChar char="Þ"/>
+            </a:pPr>
             <a:r>
               <a:rPr lang="en-US" sz="2800" dirty="0" smtClean="0">
                 <a:solidFill>
@@ -26827,54 +26664,7 @@
                 <a:ea typeface="Consolas" charset="0"/>
                 <a:cs typeface="Consolas" charset="0"/>
               </a:rPr>
-              <a:t>)</a:t>
-            </a:r>
-            <a:endParaRPr lang="en-US" sz="2800" dirty="0" smtClean="0">
-              <a:solidFill>
-                <a:schemeClr val="tx2"/>
-              </a:solidFill>
-              <a:latin typeface="Consolas" charset="0"/>
-              <a:ea typeface="Consolas" charset="0"/>
-              <a:cs typeface="Consolas" charset="0"/>
-            </a:endParaRPr>
-          </a:p>
-          <a:p>
-            <a:pPr marL="457200" indent="-457200">
-              <a:buFont typeface="Symbol" charset="2"/>
-              <a:buChar char="Þ"/>
-            </a:pPr>
-            <a:r>
-              <a:rPr lang="en-US" sz="2800" dirty="0" smtClean="0">
-                <a:solidFill>
-                  <a:schemeClr val="tx2"/>
-                </a:solidFill>
-                <a:latin typeface="Consolas" charset="0"/>
-                <a:ea typeface="Consolas" charset="0"/>
-                <a:cs typeface="Consolas" charset="0"/>
-              </a:rPr>
-              <a:t>   (lambda (f) (lambda </a:t>
-            </a:r>
-            <a:r>
-              <a:rPr lang="en-US" sz="2800" dirty="0" smtClean="0">
-                <a:solidFill>
-                  <a:schemeClr val="tx2"/>
-                </a:solidFill>
-                <a:latin typeface="Consolas" charset="0"/>
-                <a:ea typeface="Consolas" charset="0"/>
-                <a:cs typeface="Consolas" charset="0"/>
-              </a:rPr>
-              <a:t>(x ...) body</a:t>
-            </a:r>
-            <a:r>
-              <a:rPr lang="en-US" sz="2800" dirty="0" smtClean="0">
-                <a:solidFill>
-                  <a:schemeClr val="tx2"/>
-                </a:solidFill>
-                <a:latin typeface="Consolas" charset="0"/>
-                <a:ea typeface="Consolas" charset="0"/>
-                <a:cs typeface="Consolas" charset="0"/>
-              </a:rPr>
-              <a:t>))</a:t>
+              <a:t>   (lambda (f) (lambda (x ...) body))</a:t>
             </a:r>
             <a:endParaRPr lang="en-US" sz="2800" dirty="0">
               <a:solidFill>
@@ -26978,27 +26768,8 @@
                 <a:ea typeface="Consolas" charset="0"/>
                 <a:cs typeface="Consolas" charset="0"/>
               </a:rPr>
-              <a:t>(named-lambda f (x ...) body</a:t>
-            </a:r>
-            <a:r>
-              <a:rPr lang="en-US" sz="2800" dirty="0" smtClean="0">
-                <a:solidFill>
-                  <a:schemeClr val="tx2"/>
-                </a:solidFill>
-                <a:latin typeface="Consolas" charset="0"/>
-                <a:ea typeface="Consolas" charset="0"/>
-                <a:cs typeface="Consolas" charset="0"/>
-              </a:rPr>
-              <a:t>)</a:t>
-            </a:r>
-            <a:endParaRPr lang="en-US" sz="2800" dirty="0" smtClean="0">
-              <a:solidFill>
-                <a:schemeClr val="tx2"/>
-              </a:solidFill>
-              <a:latin typeface="Consolas" charset="0"/>
-              <a:ea typeface="Consolas" charset="0"/>
-              <a:cs typeface="Consolas" charset="0"/>
-            </a:endParaRPr>
+              <a:t>(named-lambda f (x ...) body)</a:t>
+            </a:r>
           </a:p>
           <a:p>
             <a:pPr marL="457200" indent="-457200">
@@ -28659,27 +28430,8 @@
                 <a:ea typeface="Consolas" charset="0"/>
                 <a:cs typeface="Consolas" charset="0"/>
               </a:rPr>
-              <a:t>(named-lambda f (x ...) body</a:t>
-            </a:r>
-            <a:r>
-              <a:rPr lang="en-US" sz="2800" dirty="0" smtClean="0">
-                <a:solidFill>
-                  <a:schemeClr val="tx2"/>
-                </a:solidFill>
-                <a:latin typeface="Consolas" charset="0"/>
-                <a:ea typeface="Consolas" charset="0"/>
-                <a:cs typeface="Consolas" charset="0"/>
-              </a:rPr>
-              <a:t>)</a:t>
-            </a:r>
-            <a:endParaRPr lang="en-US" sz="2800" dirty="0" smtClean="0">
-              <a:solidFill>
-                <a:schemeClr val="tx2"/>
-              </a:solidFill>
-              <a:latin typeface="Consolas" charset="0"/>
-              <a:ea typeface="Consolas" charset="0"/>
-              <a:cs typeface="Consolas" charset="0"/>
-            </a:endParaRPr>
+              <a:t>(named-lambda f (x ...) body)</a:t>
+            </a:r>
           </a:p>
           <a:p>
             <a:pPr marL="457200" indent="-457200">
@@ -30287,27 +30039,8 @@
                 <a:ea typeface="Consolas" charset="0"/>
                 <a:cs typeface="Consolas" charset="0"/>
               </a:rPr>
-              <a:t>(named-lambda f (x ...) body</a:t>
-            </a:r>
-            <a:r>
-              <a:rPr lang="en-US" sz="2800" dirty="0" smtClean="0">
-                <a:solidFill>
-                  <a:schemeClr val="tx2"/>
-                </a:solidFill>
-                <a:latin typeface="Consolas" charset="0"/>
-                <a:ea typeface="Consolas" charset="0"/>
-                <a:cs typeface="Consolas" charset="0"/>
-              </a:rPr>
-              <a:t>)</a:t>
-            </a:r>
-            <a:endParaRPr lang="en-US" sz="2800" dirty="0" smtClean="0">
-              <a:solidFill>
-                <a:schemeClr val="tx2"/>
-              </a:solidFill>
-              <a:latin typeface="Consolas" charset="0"/>
-              <a:ea typeface="Consolas" charset="0"/>
-              <a:cs typeface="Consolas" charset="0"/>
-            </a:endParaRPr>
+              <a:t>(named-lambda f (x ...) body)</a:t>
+            </a:r>
           </a:p>
           <a:p>
             <a:pPr marL="457200" indent="-457200">
@@ -32010,27 +31743,8 @@
                 <a:ea typeface="Consolas" charset="0"/>
                 <a:cs typeface="Consolas" charset="0"/>
               </a:rPr>
-              <a:t>(named-lambda f (x ...) body</a:t>
-            </a:r>
-            <a:r>
-              <a:rPr lang="en-US" sz="2800" dirty="0" smtClean="0">
-                <a:solidFill>
-                  <a:schemeClr val="tx2"/>
-                </a:solidFill>
-                <a:latin typeface="Consolas" charset="0"/>
-                <a:ea typeface="Consolas" charset="0"/>
-                <a:cs typeface="Consolas" charset="0"/>
-              </a:rPr>
-              <a:t>)</a:t>
-            </a:r>
-            <a:endParaRPr lang="en-US" sz="2800" dirty="0" smtClean="0">
-              <a:solidFill>
-                <a:schemeClr val="tx2"/>
-              </a:solidFill>
-              <a:latin typeface="Consolas" charset="0"/>
-              <a:ea typeface="Consolas" charset="0"/>
-              <a:cs typeface="Consolas" charset="0"/>
-            </a:endParaRPr>
+              <a:t>(named-lambda f (x ...) body)</a:t>
+            </a:r>
           </a:p>
           <a:p>
             <a:pPr marL="457200" indent="-457200">
@@ -33892,27 +33606,8 @@
                 <a:ea typeface="Consolas" charset="0"/>
                 <a:cs typeface="Consolas" charset="0"/>
               </a:rPr>
-              <a:t>(named-lambda f (x ...) body</a:t>
-            </a:r>
-            <a:r>
-              <a:rPr lang="en-US" sz="2800" dirty="0" smtClean="0">
-                <a:solidFill>
-                  <a:schemeClr val="tx2"/>
-                </a:solidFill>
-                <a:latin typeface="Consolas" charset="0"/>
-                <a:ea typeface="Consolas" charset="0"/>
-                <a:cs typeface="Consolas" charset="0"/>
-              </a:rPr>
-              <a:t>)</a:t>
-            </a:r>
-            <a:endParaRPr lang="en-US" sz="2800" dirty="0" smtClean="0">
-              <a:solidFill>
-                <a:schemeClr val="tx2"/>
-              </a:solidFill>
-              <a:latin typeface="Consolas" charset="0"/>
-              <a:ea typeface="Consolas" charset="0"/>
-              <a:cs typeface="Consolas" charset="0"/>
-            </a:endParaRPr>
+              <a:t>(named-lambda f (x ...) body)</a:t>
+            </a:r>
           </a:p>
           <a:p>
             <a:pPr marL="457200" indent="-457200">

</xml_diff>